<commit_message>
add : Network Cellular
</commit_message>
<xml_diff>
--- a/AWS/08. AWS Event Driven Architecture.pptx
+++ b/AWS/08. AWS Event Driven Architecture.pptx
@@ -231,7 +231,7 @@
           <a:p>
             <a:fld id="{1BA909BF-503D-46EF-A7F0-824009663C50}" type="datetimeFigureOut">
               <a:rPr lang="ko-KR" altLang="en-US" smtClean="0"/>
-              <a:t>2023-01-04</a:t>
+              <a:t>2023-01-11</a:t>
             </a:fld>
             <a:endParaRPr lang="ko-KR" altLang="en-US"/>
           </a:p>
@@ -729,7 +729,7 @@
           <a:p>
             <a:fld id="{89B3C2D2-5A1C-4C7F-8B84-C4DC8EB1FF56}" type="datetimeFigureOut">
               <a:rPr lang="ko-KR" altLang="en-US" smtClean="0"/>
-              <a:t>2023-01-04</a:t>
+              <a:t>2023-01-11</a:t>
             </a:fld>
             <a:endParaRPr lang="ko-KR" altLang="en-US"/>
           </a:p>
@@ -927,7 +927,7 @@
           <a:p>
             <a:fld id="{89B3C2D2-5A1C-4C7F-8B84-C4DC8EB1FF56}" type="datetimeFigureOut">
               <a:rPr lang="ko-KR" altLang="en-US" smtClean="0"/>
-              <a:t>2023-01-04</a:t>
+              <a:t>2023-01-11</a:t>
             </a:fld>
             <a:endParaRPr lang="ko-KR" altLang="en-US"/>
           </a:p>
@@ -1135,7 +1135,7 @@
           <a:p>
             <a:fld id="{89B3C2D2-5A1C-4C7F-8B84-C4DC8EB1FF56}" type="datetimeFigureOut">
               <a:rPr lang="ko-KR" altLang="en-US" smtClean="0"/>
-              <a:t>2023-01-04</a:t>
+              <a:t>2023-01-11</a:t>
             </a:fld>
             <a:endParaRPr lang="ko-KR" altLang="en-US"/>
           </a:p>
@@ -1333,7 +1333,7 @@
           <a:p>
             <a:fld id="{89B3C2D2-5A1C-4C7F-8B84-C4DC8EB1FF56}" type="datetimeFigureOut">
               <a:rPr lang="ko-KR" altLang="en-US" smtClean="0"/>
-              <a:t>2023-01-04</a:t>
+              <a:t>2023-01-11</a:t>
             </a:fld>
             <a:endParaRPr lang="ko-KR" altLang="en-US"/>
           </a:p>
@@ -1608,7 +1608,7 @@
           <a:p>
             <a:fld id="{89B3C2D2-5A1C-4C7F-8B84-C4DC8EB1FF56}" type="datetimeFigureOut">
               <a:rPr lang="ko-KR" altLang="en-US" smtClean="0"/>
-              <a:t>2023-01-04</a:t>
+              <a:t>2023-01-11</a:t>
             </a:fld>
             <a:endParaRPr lang="ko-KR" altLang="en-US"/>
           </a:p>
@@ -1873,7 +1873,7 @@
           <a:p>
             <a:fld id="{89B3C2D2-5A1C-4C7F-8B84-C4DC8EB1FF56}" type="datetimeFigureOut">
               <a:rPr lang="ko-KR" altLang="en-US" smtClean="0"/>
-              <a:t>2023-01-04</a:t>
+              <a:t>2023-01-11</a:t>
             </a:fld>
             <a:endParaRPr lang="ko-KR" altLang="en-US"/>
           </a:p>
@@ -2285,7 +2285,7 @@
           <a:p>
             <a:fld id="{89B3C2D2-5A1C-4C7F-8B84-C4DC8EB1FF56}" type="datetimeFigureOut">
               <a:rPr lang="ko-KR" altLang="en-US" smtClean="0"/>
-              <a:t>2023-01-04</a:t>
+              <a:t>2023-01-11</a:t>
             </a:fld>
             <a:endParaRPr lang="ko-KR" altLang="en-US"/>
           </a:p>
@@ -2426,7 +2426,7 @@
           <a:p>
             <a:fld id="{89B3C2D2-5A1C-4C7F-8B84-C4DC8EB1FF56}" type="datetimeFigureOut">
               <a:rPr lang="ko-KR" altLang="en-US" smtClean="0"/>
-              <a:t>2023-01-04</a:t>
+              <a:t>2023-01-11</a:t>
             </a:fld>
             <a:endParaRPr lang="ko-KR" altLang="en-US"/>
           </a:p>
@@ -2539,7 +2539,7 @@
           <a:p>
             <a:fld id="{89B3C2D2-5A1C-4C7F-8B84-C4DC8EB1FF56}" type="datetimeFigureOut">
               <a:rPr lang="ko-KR" altLang="en-US" smtClean="0"/>
-              <a:t>2023-01-04</a:t>
+              <a:t>2023-01-11</a:t>
             </a:fld>
             <a:endParaRPr lang="ko-KR" altLang="en-US"/>
           </a:p>
@@ -2850,7 +2850,7 @@
           <a:p>
             <a:fld id="{89B3C2D2-5A1C-4C7F-8B84-C4DC8EB1FF56}" type="datetimeFigureOut">
               <a:rPr lang="ko-KR" altLang="en-US" smtClean="0"/>
-              <a:t>2023-01-04</a:t>
+              <a:t>2023-01-11</a:t>
             </a:fld>
             <a:endParaRPr lang="ko-KR" altLang="en-US"/>
           </a:p>
@@ -3138,7 +3138,7 @@
           <a:p>
             <a:fld id="{89B3C2D2-5A1C-4C7F-8B84-C4DC8EB1FF56}" type="datetimeFigureOut">
               <a:rPr lang="ko-KR" altLang="en-US" smtClean="0"/>
-              <a:t>2023-01-04</a:t>
+              <a:t>2023-01-11</a:t>
             </a:fld>
             <a:endParaRPr lang="ko-KR" altLang="en-US"/>
           </a:p>
@@ -3379,7 +3379,7 @@
           <a:p>
             <a:fld id="{89B3C2D2-5A1C-4C7F-8B84-C4DC8EB1FF56}" type="datetimeFigureOut">
               <a:rPr lang="ko-KR" altLang="en-US" smtClean="0"/>
-              <a:t>2023-01-04</a:t>
+              <a:t>2023-01-11</a:t>
             </a:fld>
             <a:endParaRPr lang="ko-KR" altLang="en-US"/>
           </a:p>
@@ -8104,7 +8104,15 @@
           <a:p>
             <a:r>
               <a:rPr lang="en-US" altLang="ko-KR" sz="4000" b="1" dirty="0"/>
-              <a:t>Infra Automation</a:t>
+              <a:t>AWS</a:t>
+            </a:r>
+            <a:r>
+              <a:rPr lang="ko-KR" altLang="en-US" sz="4000" b="1" dirty="0"/>
+              <a:t> </a:t>
+            </a:r>
+            <a:r>
+              <a:rPr lang="en-US" altLang="ko-KR" sz="4000" b="1" dirty="0"/>
+              <a:t>EDA</a:t>
             </a:r>
             <a:endParaRPr lang="ko-KR" altLang="en-US" sz="4000" b="1" dirty="0"/>
           </a:p>

</xml_diff>